<commit_message>
Updates in Powerpoint to PDf logic
</commit_message>
<xml_diff>
--- a/SourceCode/GreenField/GreenField.Web/Templates/ICPresentationTemplate.pptx
+++ b/SourceCode/GreenField/GreenField.Web/Templates/ICPresentationTemplate.pptx
@@ -1,6 +1,6 @@
 
 <file path=ppt/presentation.xml><?xml version="1.0" encoding="utf-8"?>
-<p:presentation xmlns:a="http://schemas.openxmlformats.org/drawingml/2006/main" xmlns:r="http://schemas.openxmlformats.org/officeDocument/2006/relationships" xmlns:p="http://schemas.openxmlformats.org/presentationml/2006/main" firstSlideNum="0" showSpecialPlsOnTitleSld="0" strictFirstAndLastChars="0" saveSubsetFonts="1">
+<p:presentation xmlns:a="http://schemas.openxmlformats.org/drawingml/2006/main" xmlns:r="http://schemas.openxmlformats.org/officeDocument/2006/relationships" xmlns:p="http://schemas.openxmlformats.org/presentationml/2006/main" showSpecialPlsOnTitleSld="0" strictFirstAndLastChars="0" saveSubsetFonts="1">
   <p:sldMasterIdLst>
     <p:sldMasterId id="2147483653" r:id="rId1"/>
     <p:sldMasterId id="2147483718" r:id="rId2"/>
@@ -19,7 +19,7 @@
     <p:sldId id="2331" r:id="rId7"/>
   </p:sldIdLst>
   <p:sldSz cx="9144000" cy="7315200"/>
-  <p:notesSz cx="6985000" cy="9271000"/>
+  <p:notesSz cx="6950075" cy="9236075"/>
   <p:defaultTextStyle>
     <a:defPPr>
       <a:defRPr lang="en-US"/>
@@ -222,7 +222,7 @@
         <p:spPr bwMode="auto">
           <a:xfrm>
             <a:off x="0" y="0"/>
-            <a:ext cx="3028950" cy="465138"/>
+            <a:ext cx="3013805" cy="463386"/>
           </a:xfrm>
           <a:prstGeom prst="rect">
             <a:avLst/>
@@ -247,7 +247,7 @@
             </a:prstTxWarp>
           </a:bodyPr>
           <a:lstStyle>
-            <a:lvl1pPr algn="l" defTabSz="956205">
+            <a:lvl1pPr algn="l" defTabSz="952093">
               <a:spcBef>
                 <a:spcPct val="0"/>
               </a:spcBef>
@@ -279,8 +279,8 @@
         </p:nvSpPr>
         <p:spPr bwMode="auto">
           <a:xfrm>
-            <a:off x="3956050" y="0"/>
-            <a:ext cx="3028950" cy="465138"/>
+            <a:off x="3936270" y="0"/>
+            <a:ext cx="3013805" cy="463386"/>
           </a:xfrm>
           <a:prstGeom prst="rect">
             <a:avLst/>
@@ -305,7 +305,7 @@
             </a:prstTxWarp>
           </a:bodyPr>
           <a:lstStyle>
-            <a:lvl1pPr algn="r" defTabSz="956205">
+            <a:lvl1pPr algn="r" defTabSz="952093">
               <a:spcBef>
                 <a:spcPct val="0"/>
               </a:spcBef>
@@ -337,8 +337,8 @@
         </p:nvSpPr>
         <p:spPr bwMode="auto">
           <a:xfrm>
-            <a:off x="1323975" y="692150"/>
-            <a:ext cx="4351338" cy="3482975"/>
+            <a:off x="1314450" y="688975"/>
+            <a:ext cx="4335463" cy="3470275"/>
           </a:xfrm>
           <a:prstGeom prst="rect">
             <a:avLst/>
@@ -375,8 +375,8 @@
         </p:nvSpPr>
         <p:spPr bwMode="auto">
           <a:xfrm>
-            <a:off x="933450" y="4403725"/>
-            <a:ext cx="5118100" cy="4175125"/>
+            <a:off x="928783" y="4387136"/>
+            <a:ext cx="5092510" cy="4159397"/>
           </a:xfrm>
           <a:prstGeom prst="rect">
             <a:avLst/>
@@ -450,8 +450,8 @@
         </p:nvSpPr>
         <p:spPr bwMode="auto">
           <a:xfrm>
-            <a:off x="0" y="8805863"/>
-            <a:ext cx="3028950" cy="465137"/>
+            <a:off x="0" y="8772691"/>
+            <a:ext cx="3013805" cy="463385"/>
           </a:xfrm>
           <a:prstGeom prst="rect">
             <a:avLst/>
@@ -476,7 +476,7 @@
             </a:prstTxWarp>
           </a:bodyPr>
           <a:lstStyle>
-            <a:lvl1pPr algn="l" defTabSz="956205">
+            <a:lvl1pPr algn="l" defTabSz="952093">
               <a:spcBef>
                 <a:spcPct val="0"/>
               </a:spcBef>
@@ -508,8 +508,8 @@
         </p:nvSpPr>
         <p:spPr bwMode="auto">
           <a:xfrm>
-            <a:off x="3956050" y="8805863"/>
-            <a:ext cx="3028950" cy="465137"/>
+            <a:off x="3936270" y="8772691"/>
+            <a:ext cx="3013805" cy="463385"/>
           </a:xfrm>
           <a:prstGeom prst="rect">
             <a:avLst/>
@@ -534,7 +534,7 @@
             </a:prstTxWarp>
           </a:bodyPr>
           <a:lstStyle>
-            <a:lvl1pPr algn="r" defTabSz="956205">
+            <a:lvl1pPr algn="r" defTabSz="952093">
               <a:spcBef>
                 <a:spcPct val="0"/>
               </a:spcBef>
@@ -813,12 +813,9 @@
             <a:pPr>
               <a:defRPr/>
             </a:pPr>
-            <a:fld id="{E0EC0E66-5818-4022-8DA2-8D33F8BA1E1C}" type="datetime3">
-              <a:rPr lang="en-US"/>
-              <a:pPr>
-                <a:defRPr/>
-              </a:pPr>
-              <a:t>7 September 2012</a:t>
+            <a:fld id="{1F4822A6-C7A5-44D7-8821-5EABF635D97B}" type="datetime4">
+              <a:rPr lang="en-US" smtClean="0"/>
+              <a:t>October 4, 2012</a:t>
             </a:fld>
             <a:endParaRPr lang="en-US"/>
           </a:p>
@@ -996,12 +993,9 @@
             <a:pPr>
               <a:defRPr/>
             </a:pPr>
-            <a:fld id="{C9BBDE40-D235-461B-8208-D29615B9E10C}" type="datetime3">
-              <a:rPr lang="en-US"/>
-              <a:pPr>
-                <a:defRPr/>
-              </a:pPr>
-              <a:t>7 September 2012</a:t>
+            <a:fld id="{D4CB6172-824B-4CB0-BAC6-5AEF55E8765C}" type="datetime4">
+              <a:rPr lang="en-US" smtClean="0"/>
+              <a:t>October 4, 2012</a:t>
             </a:fld>
             <a:endParaRPr lang="en-US"/>
           </a:p>
@@ -1151,12 +1145,9 @@
             <a:pPr>
               <a:defRPr/>
             </a:pPr>
-            <a:fld id="{21B08433-4F0D-4FF5-AD36-9E8D0BA89A47}" type="datetime3">
-              <a:rPr lang="en-US"/>
-              <a:pPr>
-                <a:defRPr/>
-              </a:pPr>
-              <a:t>7 September 2012</a:t>
+            <a:fld id="{86A9B45F-E5B1-4402-9FF1-724381F44DFB}" type="datetime4">
+              <a:rPr lang="en-US" smtClean="0"/>
+              <a:t>October 4, 2012</a:t>
             </a:fld>
             <a:endParaRPr lang="en-US"/>
           </a:p>
@@ -1533,12 +1524,9 @@
             <a:pPr>
               <a:defRPr/>
             </a:pPr>
-            <a:fld id="{3DD8F977-2A51-4519-9B0C-6456C4F85F1A}" type="datetime3">
-              <a:rPr lang="en-US"/>
-              <a:pPr>
-                <a:defRPr/>
-              </a:pPr>
-              <a:t>7 September 2012</a:t>
+            <a:fld id="{0A551E71-1E03-4AB6-A7D1-41670FBAE107}" type="datetime4">
+              <a:rPr lang="en-US" smtClean="0"/>
+              <a:t>October 4, 2012</a:t>
             </a:fld>
             <a:endParaRPr lang="en-US"/>
           </a:p>
@@ -1814,12 +1802,9 @@
             <a:pPr>
               <a:defRPr/>
             </a:pPr>
-            <a:fld id="{8A862725-58C0-4B90-8326-5FB38D847A33}" type="datetime3">
-              <a:rPr lang="en-US"/>
-              <a:pPr>
-                <a:defRPr/>
-              </a:pPr>
-              <a:t>7 September 2012</a:t>
+            <a:fld id="{3F52BBDD-43E2-46DC-A90E-A4DB78218758}" type="datetime4">
+              <a:rPr lang="en-US" smtClean="0"/>
+              <a:t>October 4, 2012</a:t>
             </a:fld>
             <a:endParaRPr lang="en-US"/>
           </a:p>
@@ -2137,12 +2122,9 @@
             <a:pPr>
               <a:defRPr/>
             </a:pPr>
-            <a:fld id="{5CA76F49-FE66-41FE-89E9-3ABDA150C604}" type="datetime3">
-              <a:rPr lang="en-US"/>
-              <a:pPr>
-                <a:defRPr/>
-              </a:pPr>
-              <a:t>7 September 2012</a:t>
+            <a:fld id="{A2D1C72E-EDEA-45BB-889F-CDB42F6D9578}" type="datetime4">
+              <a:rPr lang="en-US" smtClean="0"/>
+              <a:t>October 4, 2012</a:t>
             </a:fld>
             <a:endParaRPr lang="en-US"/>
           </a:p>
@@ -2706,12 +2688,9 @@
             <a:pPr>
               <a:defRPr/>
             </a:pPr>
-            <a:fld id="{46BA6C05-3557-42FC-ADE0-D47142671DA7}" type="datetime3">
-              <a:rPr lang="en-US"/>
-              <a:pPr>
-                <a:defRPr/>
-              </a:pPr>
-              <a:t>7 September 2012</a:t>
+            <a:fld id="{9B32EA31-93E0-4586-AFE1-7194AEC54BFD}" type="datetime4">
+              <a:rPr lang="en-US" smtClean="0"/>
+              <a:t>October 4, 2012</a:t>
             </a:fld>
             <a:endParaRPr lang="en-US"/>
           </a:p>
@@ -2836,12 +2815,9 @@
             <a:pPr>
               <a:defRPr/>
             </a:pPr>
-            <a:fld id="{1C6319F5-4279-47E2-A728-06444EA2FCC4}" type="datetime3">
-              <a:rPr lang="en-US"/>
-              <a:pPr>
-                <a:defRPr/>
-              </a:pPr>
-              <a:t>7 September 2012</a:t>
+            <a:fld id="{8062399F-83F6-439F-8C6A-E46B9E57095B}" type="datetime4">
+              <a:rPr lang="en-US" smtClean="0"/>
+              <a:t>October 4, 2012</a:t>
             </a:fld>
             <a:endParaRPr lang="en-US"/>
           </a:p>
@@ -3148,12 +3124,9 @@
             <a:pPr>
               <a:defRPr/>
             </a:pPr>
-            <a:fld id="{DAA38550-9747-4631-AD30-AF409C25205C}" type="datetime3">
-              <a:rPr lang="en-US"/>
-              <a:pPr>
-                <a:defRPr/>
-              </a:pPr>
-              <a:t>7 September 2012</a:t>
+            <a:fld id="{222E3082-CEC2-4104-A63D-3C1FF16CAEA8}" type="datetime4">
+              <a:rPr lang="en-US" smtClean="0"/>
+              <a:t>October 4, 2012</a:t>
             </a:fld>
             <a:endParaRPr lang="en-US"/>
           </a:p>
@@ -3354,6 +3327,10 @@
           </p:nvPr>
         </p:nvSpPr>
         <p:spPr>
+          <a:xfrm>
+            <a:off x="783936" y="6889239"/>
+            <a:ext cx="903287" cy="315913"/>
+          </a:xfrm>
           <a:ln/>
         </p:spPr>
         <p:txBody>
@@ -3367,14 +3344,10 @@
             <a:pPr>
               <a:defRPr/>
             </a:pPr>
-            <a:fld id="{A1D42741-87B3-435C-9C87-19D4CE5EFBD8}" type="slidenum">
-              <a:rPr lang="en-GB"/>
-              <a:pPr>
-                <a:defRPr/>
-              </a:pPr>
-              <a:t>‹#›</a:t>
-            </a:fld>
-            <a:endParaRPr lang="en-GB"/>
+            <a:r>
+              <a:rPr lang="en-GB" dirty="0" smtClean="0"/>
+              <a:t>&lt;#&gt;</a:t>
+            </a:r>
           </a:p>
         </p:txBody>
       </p:sp>
@@ -3388,7 +3361,12 @@
             <p:ph type="dt" sz="half" idx="11"/>
           </p:nvPr>
         </p:nvSpPr>
-        <p:spPr/>
+        <p:spPr>
+          <a:xfrm>
+            <a:off x="6977120" y="6780213"/>
+            <a:ext cx="2133600" cy="388937"/>
+          </a:xfrm>
+        </p:spPr>
         <p:txBody>
           <a:bodyPr/>
           <a:lstStyle>
@@ -3400,14 +3378,11 @@
             <a:pPr>
               <a:defRPr/>
             </a:pPr>
-            <a:fld id="{A08D7127-EA02-41AA-AB57-3EF270CDC8CD}" type="datetime3">
-              <a:rPr lang="en-US"/>
-              <a:pPr>
-                <a:defRPr/>
-              </a:pPr>
-              <a:t>7 September 2012</a:t>
+            <a:fld id="{82FB4016-FDC3-41D6-8337-8B2F9C50907A}" type="datetime4">
+              <a:rPr lang="en-US" smtClean="0"/>
+              <a:t>October 4, 2012</a:t>
             </a:fld>
-            <a:endParaRPr lang="en-US"/>
+            <a:endParaRPr lang="en-US" dirty="0"/>
           </a:p>
         </p:txBody>
       </p:sp>
@@ -3632,12 +3607,9 @@
             <a:pPr>
               <a:defRPr/>
             </a:pPr>
-            <a:fld id="{C31DC025-BA7B-48CF-B213-EA73D3D51DEE}" type="datetime3">
-              <a:rPr lang="en-US"/>
-              <a:pPr>
-                <a:defRPr/>
-              </a:pPr>
-              <a:t>7 September 2012</a:t>
+            <a:fld id="{1015E7F2-8DEE-48C2-A3C4-2CDD3A7D8C68}" type="datetime4">
+              <a:rPr lang="en-US" smtClean="0"/>
+              <a:t>October 4, 2012</a:t>
             </a:fld>
             <a:endParaRPr lang="en-US"/>
           </a:p>
@@ -3837,12 +3809,9 @@
             <a:pPr>
               <a:defRPr/>
             </a:pPr>
-            <a:fld id="{5D5C0FB2-8409-49C1-BAE2-17B7DFF1D730}" type="datetime3">
-              <a:rPr lang="en-US"/>
-              <a:pPr>
-                <a:defRPr/>
-              </a:pPr>
-              <a:t>7 September 2012</a:t>
+            <a:fld id="{6D55645B-8D24-49C3-AEA2-D4AD71AF9C46}" type="datetime4">
+              <a:rPr lang="en-US" smtClean="0"/>
+              <a:t>October 4, 2012</a:t>
             </a:fld>
             <a:endParaRPr lang="en-US"/>
           </a:p>
@@ -4052,12 +4021,9 @@
             <a:pPr>
               <a:defRPr/>
             </a:pPr>
-            <a:fld id="{0D7A1089-E242-43EC-A361-74C7B3C99040}" type="datetime3">
-              <a:rPr lang="en-US"/>
-              <a:pPr>
-                <a:defRPr/>
-              </a:pPr>
-              <a:t>7 September 2012</a:t>
+            <a:fld id="{D02B4747-D752-4F72-9B4F-8F5E4DA8051D}" type="datetime4">
+              <a:rPr lang="en-US" smtClean="0"/>
+              <a:t>October 4, 2012</a:t>
             </a:fld>
             <a:endParaRPr lang="en-US"/>
           </a:p>
@@ -4306,12 +4272,9 @@
             <a:pPr>
               <a:defRPr/>
             </a:pPr>
-            <a:fld id="{AC0C69D8-D569-451B-A558-0A5089F56282}" type="datetime3">
-              <a:rPr lang="en-US"/>
-              <a:pPr>
-                <a:defRPr/>
-              </a:pPr>
-              <a:t>7 September 2012</a:t>
+            <a:fld id="{A05B7358-510B-4F04-9752-AE52EA0ADFFE}" type="datetime4">
+              <a:rPr lang="en-US" smtClean="0"/>
+              <a:t>October 4, 2012</a:t>
             </a:fld>
             <a:endParaRPr lang="en-US"/>
           </a:p>
@@ -4597,12 +4560,9 @@
             <a:pPr>
               <a:defRPr/>
             </a:pPr>
-            <a:fld id="{2904093C-2B0F-40DC-B221-B5940A205EF8}" type="datetime3">
-              <a:rPr lang="en-US"/>
-              <a:pPr>
-                <a:defRPr/>
-              </a:pPr>
-              <a:t>7 September 2012</a:t>
+            <a:fld id="{79392749-F90E-4469-ADC8-8B354CE8956B}" type="datetime4">
+              <a:rPr lang="en-US" smtClean="0"/>
+              <a:t>October 4, 2012</a:t>
             </a:fld>
             <a:endParaRPr lang="en-US"/>
           </a:p>
@@ -5027,12 +4987,9 @@
             <a:pPr>
               <a:defRPr/>
             </a:pPr>
-            <a:fld id="{A8992E1D-45D0-4BF1-8218-471E07D5F6A5}" type="datetime3">
-              <a:rPr lang="en-US"/>
-              <a:pPr>
-                <a:defRPr/>
-              </a:pPr>
-              <a:t>7 September 2012</a:t>
+            <a:fld id="{F59E398C-EDE0-41A8-890E-00F4900FCBE8}" type="datetime4">
+              <a:rPr lang="en-US" smtClean="0"/>
+              <a:t>October 4, 2012</a:t>
             </a:fld>
             <a:endParaRPr lang="en-US"/>
           </a:p>
@@ -5148,12 +5105,9 @@
             <a:pPr>
               <a:defRPr/>
             </a:pPr>
-            <a:fld id="{A018A4C3-5326-423C-9E30-9D20B8ADE3B5}" type="datetime3">
-              <a:rPr lang="en-US"/>
-              <a:pPr>
-                <a:defRPr/>
-              </a:pPr>
-              <a:t>7 September 2012</a:t>
+            <a:fld id="{A5AB7662-EDEC-4540-BF5C-48B3B34A8BB2}" type="datetime4">
+              <a:rPr lang="en-US" smtClean="0"/>
+              <a:t>October 4, 2012</a:t>
             </a:fld>
             <a:endParaRPr lang="en-US"/>
           </a:p>
@@ -5428,12 +5382,9 @@
             <a:pPr>
               <a:defRPr/>
             </a:pPr>
-            <a:fld id="{E83EAA83-51FC-4110-9453-A41ED4C3477D}" type="datetime3">
-              <a:rPr lang="en-US"/>
-              <a:pPr>
-                <a:defRPr/>
-              </a:pPr>
-              <a:t>7 September 2012</a:t>
+            <a:fld id="{6B49991A-1422-4BF5-958A-B2E36BF27515}" type="datetime4">
+              <a:rPr lang="en-US" smtClean="0"/>
+              <a:t>October 4, 2012</a:t>
             </a:fld>
             <a:endParaRPr lang="en-US"/>
           </a:p>
@@ -5685,12 +5636,9 @@
             <a:pPr>
               <a:defRPr/>
             </a:pPr>
-            <a:fld id="{44CAF2E3-C4A2-40ED-9820-9F14E2085433}" type="datetime3">
-              <a:rPr lang="en-US"/>
-              <a:pPr>
-                <a:defRPr/>
-              </a:pPr>
-              <a:t>7 September 2012</a:t>
+            <a:fld id="{2EA41A95-0F18-4751-A33E-35034B88C83D}" type="datetime4">
+              <a:rPr lang="en-US" smtClean="0"/>
+              <a:t>October 4, 2012</a:t>
             </a:fld>
             <a:endParaRPr lang="en-US"/>
           </a:p>
@@ -5858,12 +5806,9 @@
             <a:pPr>
               <a:defRPr/>
             </a:pPr>
-            <a:fld id="{B64EAA09-E1DB-4AB0-9884-DDF2DA53B473}" type="datetime3">
-              <a:rPr lang="en-US"/>
-              <a:pPr>
-                <a:defRPr/>
-              </a:pPr>
-              <a:t>7 September 2012</a:t>
+            <a:fld id="{C4F1A8C9-83EA-4AE3-AA3E-54AE51959437}" type="datetime4">
+              <a:rPr lang="en-US" smtClean="0"/>
+              <a:t>October 4, 2012</a:t>
             </a:fld>
             <a:endParaRPr lang="en-US"/>
           </a:p>
@@ -6216,12 +6161,9 @@
             <a:pPr>
               <a:defRPr/>
             </a:pPr>
-            <a:fld id="{C93B1772-F863-457E-A405-215829372AF1}" type="datetime3">
-              <a:rPr lang="en-US"/>
-              <a:pPr>
-                <a:defRPr/>
-              </a:pPr>
-              <a:t>7 September 2012</a:t>
+            <a:fld id="{05FED699-BC16-4629-A79A-5C7F8415F244}" type="datetime4">
+              <a:rPr lang="en-US" smtClean="0"/>
+              <a:t>October 4, 2012</a:t>
             </a:fld>
             <a:endParaRPr lang="en-US"/>
           </a:p>
@@ -9393,9 +9335,9 @@
             <a:fld id="{35720554-C505-4EFE-BF34-0C24B76C5082}" type="slidenum">
               <a:rPr lang="en-GB" sz="900" b="0" smtClean="0"/>
               <a:pPr/>
-              <a:t>0</a:t>
+              <a:t>1</a:t>
             </a:fld>
-            <a:endParaRPr lang="en-GB" sz="900" b="0" smtClean="0"/>
+            <a:endParaRPr lang="en-GB" sz="900" b="0" dirty="0" smtClean="0"/>
           </a:p>
         </p:txBody>
       </p:sp>
@@ -9417,12 +9359,9 @@
             <a:pPr>
               <a:defRPr/>
             </a:pPr>
-            <a:fld id="{F29F83BB-DDE4-4D9C-9814-0143B205ED09}" type="datetime3">
-              <a:rPr lang="en-US"/>
-              <a:pPr>
-                <a:defRPr/>
-              </a:pPr>
-              <a:t>7 September 2012</a:t>
+            <a:fld id="{B9F65A27-B0FB-41A7-9B79-039B634A0561}" type="datetime4">
+              <a:rPr lang="en-US" smtClean="0"/>
+              <a:t>October 4, 2012</a:t>
             </a:fld>
             <a:endParaRPr lang="en-US"/>
           </a:p>
@@ -9840,7 +9779,7 @@
             <a:fld id="{E2CD1E1F-E10D-400C-AE00-0B773CD74C75}" type="slidenum">
               <a:rPr lang="en-GB" sz="900" b="0" smtClean="0"/>
               <a:pPr/>
-              <a:t>1</a:t>
+              <a:t>2</a:t>
             </a:fld>
             <a:endParaRPr lang="en-GB" sz="900" b="0" smtClean="0"/>
           </a:p>
@@ -9864,12 +9803,9 @@
             <a:pPr>
               <a:defRPr/>
             </a:pPr>
-            <a:fld id="{67F53407-EDCF-41B3-B560-A7B86EB044F0}" type="datetime3">
-              <a:rPr lang="en-US"/>
-              <a:pPr>
-                <a:defRPr/>
-              </a:pPr>
-              <a:t>7 September 2012</a:t>
+            <a:fld id="{AED26F29-33DF-4B6C-899D-2A3C193178A7}" type="datetime4">
+              <a:rPr lang="en-US" smtClean="0"/>
+              <a:t>October 4, 2012</a:t>
             </a:fld>
             <a:endParaRPr lang="en-US"/>
           </a:p>
@@ -10219,7 +10155,7 @@
             <a:fld id="{13166C4B-08DD-471E-9628-CFC9ABC03F2A}" type="slidenum">
               <a:rPr lang="en-GB" sz="900" b="0" smtClean="0"/>
               <a:pPr/>
-              <a:t>2</a:t>
+              <a:t>3</a:t>
             </a:fld>
             <a:endParaRPr lang="en-GB" sz="900" b="0" smtClean="0"/>
           </a:p>
@@ -10243,12 +10179,9 @@
             <a:pPr>
               <a:defRPr/>
             </a:pPr>
-            <a:fld id="{2C3FE423-DDA5-4C18-A349-58B2C2315C8F}" type="datetime3">
-              <a:rPr lang="en-US"/>
-              <a:pPr>
-                <a:defRPr/>
-              </a:pPr>
-              <a:t>7 September 2012</a:t>
+            <a:fld id="{18538A7C-955F-4A58-A6A9-F847CAE036DD}" type="datetime4">
+              <a:rPr lang="en-US" smtClean="0"/>
+              <a:t>October 4, 2012</a:t>
             </a:fld>
             <a:endParaRPr lang="en-US"/>
           </a:p>
@@ -10445,7 +10378,7 @@
             <a:fld id="{5CDED16A-1767-488D-92AE-84BD8BD13DC7}" type="slidenum">
               <a:rPr lang="en-GB" sz="900" b="0" smtClean="0"/>
               <a:pPr/>
-              <a:t>3</a:t>
+              <a:t>4</a:t>
             </a:fld>
             <a:endParaRPr lang="en-GB" sz="900" b="0" smtClean="0"/>
           </a:p>
@@ -10469,12 +10402,9 @@
             <a:pPr>
               <a:defRPr/>
             </a:pPr>
-            <a:fld id="{4BC421D1-5378-4733-8976-998F82BE632E}" type="datetime3">
-              <a:rPr lang="en-US"/>
-              <a:pPr>
-                <a:defRPr/>
-              </a:pPr>
-              <a:t>7 September 2012</a:t>
+            <a:fld id="{E9546744-ACC5-4F83-BAFA-157B97354CD4}" type="datetime4">
+              <a:rPr lang="en-US" smtClean="0"/>
+              <a:t>October 4, 2012</a:t>
             </a:fld>
             <a:endParaRPr lang="en-US"/>
           </a:p>
@@ -12349,7 +12279,7 @@
             <a:fld id="{7FF868B8-2E03-4A6B-91F8-B6857ADBDB06}" type="slidenum">
               <a:rPr lang="en-GB" sz="900" b="0" smtClean="0"/>
               <a:pPr/>
-              <a:t>4</a:t>
+              <a:t>5</a:t>
             </a:fld>
             <a:endParaRPr lang="en-GB" sz="900" b="0" smtClean="0"/>
           </a:p>
@@ -12373,12 +12303,9 @@
             <a:pPr>
               <a:defRPr/>
             </a:pPr>
-            <a:fld id="{E4C71BF3-DAFB-4ACB-810C-D45FA2D4E1C9}" type="datetime3">
-              <a:rPr lang="en-US"/>
-              <a:pPr>
-                <a:defRPr/>
-              </a:pPr>
-              <a:t>7 September 2012</a:t>
+            <a:fld id="{BB47A19F-401F-4F92-86F0-35076FCF8C9C}" type="datetime4">
+              <a:rPr lang="en-US" smtClean="0"/>
+              <a:t>October 4, 2012</a:t>
             </a:fld>
             <a:endParaRPr lang="en-US"/>
           </a:p>

</xml_diff>

<commit_message>
Updates in IC Presentation + Code Review - Morning Snapshot
</commit_message>
<xml_diff>
--- a/SourceCode/GreenField/GreenField.Web/Templates/ICPresentationTemplate.pptx
+++ b/SourceCode/GreenField/GreenField.Web/Templates/ICPresentationTemplate.pptx
@@ -815,7 +815,7 @@
             </a:pPr>
             <a:fld id="{1F4822A6-C7A5-44D7-8821-5EABF635D97B}" type="datetime4">
               <a:rPr lang="en-US" smtClean="0"/>
-              <a:t>October 4, 2012</a:t>
+              <a:t>October 9, 2012</a:t>
             </a:fld>
             <a:endParaRPr lang="en-US"/>
           </a:p>
@@ -995,7 +995,7 @@
             </a:pPr>
             <a:fld id="{D4CB6172-824B-4CB0-BAC6-5AEF55E8765C}" type="datetime4">
               <a:rPr lang="en-US" smtClean="0"/>
-              <a:t>October 4, 2012</a:t>
+              <a:t>October 9, 2012</a:t>
             </a:fld>
             <a:endParaRPr lang="en-US"/>
           </a:p>
@@ -1147,7 +1147,7 @@
             </a:pPr>
             <a:fld id="{86A9B45F-E5B1-4402-9FF1-724381F44DFB}" type="datetime4">
               <a:rPr lang="en-US" smtClean="0"/>
-              <a:t>October 4, 2012</a:t>
+              <a:t>October 9, 2012</a:t>
             </a:fld>
             <a:endParaRPr lang="en-US"/>
           </a:p>
@@ -1526,7 +1526,7 @@
             </a:pPr>
             <a:fld id="{0A551E71-1E03-4AB6-A7D1-41670FBAE107}" type="datetime4">
               <a:rPr lang="en-US" smtClean="0"/>
-              <a:t>October 4, 2012</a:t>
+              <a:t>October 9, 2012</a:t>
             </a:fld>
             <a:endParaRPr lang="en-US"/>
           </a:p>
@@ -1804,7 +1804,7 @@
             </a:pPr>
             <a:fld id="{3F52BBDD-43E2-46DC-A90E-A4DB78218758}" type="datetime4">
               <a:rPr lang="en-US" smtClean="0"/>
-              <a:t>October 4, 2012</a:t>
+              <a:t>October 9, 2012</a:t>
             </a:fld>
             <a:endParaRPr lang="en-US"/>
           </a:p>
@@ -2124,7 +2124,7 @@
             </a:pPr>
             <a:fld id="{A2D1C72E-EDEA-45BB-889F-CDB42F6D9578}" type="datetime4">
               <a:rPr lang="en-US" smtClean="0"/>
-              <a:t>October 4, 2012</a:t>
+              <a:t>October 9, 2012</a:t>
             </a:fld>
             <a:endParaRPr lang="en-US"/>
           </a:p>
@@ -2690,7 +2690,7 @@
             </a:pPr>
             <a:fld id="{9B32EA31-93E0-4586-AFE1-7194AEC54BFD}" type="datetime4">
               <a:rPr lang="en-US" smtClean="0"/>
-              <a:t>October 4, 2012</a:t>
+              <a:t>October 9, 2012</a:t>
             </a:fld>
             <a:endParaRPr lang="en-US"/>
           </a:p>
@@ -2817,7 +2817,7 @@
             </a:pPr>
             <a:fld id="{8062399F-83F6-439F-8C6A-E46B9E57095B}" type="datetime4">
               <a:rPr lang="en-US" smtClean="0"/>
-              <a:t>October 4, 2012</a:t>
+              <a:t>October 9, 2012</a:t>
             </a:fld>
             <a:endParaRPr lang="en-US"/>
           </a:p>
@@ -3126,7 +3126,7 @@
             </a:pPr>
             <a:fld id="{222E3082-CEC2-4104-A63D-3C1FF16CAEA8}" type="datetime4">
               <a:rPr lang="en-US" smtClean="0"/>
-              <a:t>October 4, 2012</a:t>
+              <a:t>October 9, 2012</a:t>
             </a:fld>
             <a:endParaRPr lang="en-US"/>
           </a:p>
@@ -3380,7 +3380,7 @@
             </a:pPr>
             <a:fld id="{82FB4016-FDC3-41D6-8337-8B2F9C50907A}" type="datetime4">
               <a:rPr lang="en-US" smtClean="0"/>
-              <a:t>October 4, 2012</a:t>
+              <a:t>October 9, 2012</a:t>
             </a:fld>
             <a:endParaRPr lang="en-US" dirty="0"/>
           </a:p>
@@ -3609,7 +3609,7 @@
             </a:pPr>
             <a:fld id="{1015E7F2-8DEE-48C2-A3C4-2CDD3A7D8C68}" type="datetime4">
               <a:rPr lang="en-US" smtClean="0"/>
-              <a:t>October 4, 2012</a:t>
+              <a:t>October 9, 2012</a:t>
             </a:fld>
             <a:endParaRPr lang="en-US"/>
           </a:p>
@@ -3811,7 +3811,7 @@
             </a:pPr>
             <a:fld id="{6D55645B-8D24-49C3-AEA2-D4AD71AF9C46}" type="datetime4">
               <a:rPr lang="en-US" smtClean="0"/>
-              <a:t>October 4, 2012</a:t>
+              <a:t>October 9, 2012</a:t>
             </a:fld>
             <a:endParaRPr lang="en-US"/>
           </a:p>
@@ -4023,7 +4023,7 @@
             </a:pPr>
             <a:fld id="{D02B4747-D752-4F72-9B4F-8F5E4DA8051D}" type="datetime4">
               <a:rPr lang="en-US" smtClean="0"/>
-              <a:t>October 4, 2012</a:t>
+              <a:t>October 9, 2012</a:t>
             </a:fld>
             <a:endParaRPr lang="en-US"/>
           </a:p>
@@ -4274,7 +4274,7 @@
             </a:pPr>
             <a:fld id="{A05B7358-510B-4F04-9752-AE52EA0ADFFE}" type="datetime4">
               <a:rPr lang="en-US" smtClean="0"/>
-              <a:t>October 4, 2012</a:t>
+              <a:t>October 9, 2012</a:t>
             </a:fld>
             <a:endParaRPr lang="en-US"/>
           </a:p>
@@ -4562,7 +4562,7 @@
             </a:pPr>
             <a:fld id="{79392749-F90E-4469-ADC8-8B354CE8956B}" type="datetime4">
               <a:rPr lang="en-US" smtClean="0"/>
-              <a:t>October 4, 2012</a:t>
+              <a:t>October 9, 2012</a:t>
             </a:fld>
             <a:endParaRPr lang="en-US"/>
           </a:p>
@@ -4989,7 +4989,7 @@
             </a:pPr>
             <a:fld id="{F59E398C-EDE0-41A8-890E-00F4900FCBE8}" type="datetime4">
               <a:rPr lang="en-US" smtClean="0"/>
-              <a:t>October 4, 2012</a:t>
+              <a:t>October 9, 2012</a:t>
             </a:fld>
             <a:endParaRPr lang="en-US"/>
           </a:p>
@@ -5107,7 +5107,7 @@
             </a:pPr>
             <a:fld id="{A5AB7662-EDEC-4540-BF5C-48B3B34A8BB2}" type="datetime4">
               <a:rPr lang="en-US" smtClean="0"/>
-              <a:t>October 4, 2012</a:t>
+              <a:t>October 9, 2012</a:t>
             </a:fld>
             <a:endParaRPr lang="en-US"/>
           </a:p>
@@ -5384,7 +5384,7 @@
             </a:pPr>
             <a:fld id="{6B49991A-1422-4BF5-958A-B2E36BF27515}" type="datetime4">
               <a:rPr lang="en-US" smtClean="0"/>
-              <a:t>October 4, 2012</a:t>
+              <a:t>October 9, 2012</a:t>
             </a:fld>
             <a:endParaRPr lang="en-US"/>
           </a:p>
@@ -5638,7 +5638,7 @@
             </a:pPr>
             <a:fld id="{2EA41A95-0F18-4751-A33E-35034B88C83D}" type="datetime4">
               <a:rPr lang="en-US" smtClean="0"/>
-              <a:t>October 4, 2012</a:t>
+              <a:t>October 9, 2012</a:t>
             </a:fld>
             <a:endParaRPr lang="en-US"/>
           </a:p>
@@ -5808,7 +5808,7 @@
             </a:pPr>
             <a:fld id="{C4F1A8C9-83EA-4AE3-AA3E-54AE51959437}" type="datetime4">
               <a:rPr lang="en-US" smtClean="0"/>
-              <a:t>October 4, 2012</a:t>
+              <a:t>October 9, 2012</a:t>
             </a:fld>
             <a:endParaRPr lang="en-US"/>
           </a:p>
@@ -6163,7 +6163,7 @@
             </a:pPr>
             <a:fld id="{05FED699-BC16-4629-A79A-5C7F8415F244}" type="datetime4">
               <a:rPr lang="en-US" smtClean="0"/>
-              <a:t>October 4, 2012</a:t>
+              <a:t>October 9, 2012</a:t>
             </a:fld>
             <a:endParaRPr lang="en-US"/>
           </a:p>
@@ -7308,7 +7308,7 @@
           <p:nvPr>
             <p:extLst>
               <p:ext uri="{D42A27DB-BD31-4B8C-83A1-F6EECF244321}">
-                <p14:modId xmlns:p14="http://schemas.microsoft.com/office/powerpoint/2010/main" val="387596838"/>
+                <p14:modId xmlns:p14="http://schemas.microsoft.com/office/powerpoint/2010/main" val="3496949177"/>
               </p:ext>
             </p:extLst>
           </p:nvPr>
@@ -7353,7 +7353,7 @@
                         <a:defRPr/>
                       </a:pPr>
                       <a:r>
-                        <a:rPr lang="en-US" sz="1000" b="1" kern="1200" dirty="0" smtClean="0">
+                        <a:rPr lang="en-US" sz="1100" b="1" kern="1200" dirty="0" smtClean="0">
                           <a:solidFill>
                             <a:schemeClr val="dk1"/>
                           </a:solidFill>
@@ -7424,7 +7424,7 @@
                         <a:defRPr/>
                       </a:pPr>
                       <a:r>
-                        <a:rPr lang="en-US" sz="1000" b="0" kern="1200" dirty="0" smtClean="0">
+                        <a:rPr lang="en-US" sz="1100" b="0" kern="1200" dirty="0" smtClean="0">
                           <a:solidFill>
                             <a:schemeClr val="dk1"/>
                           </a:solidFill>
@@ -7434,7 +7434,7 @@
                         </a:rPr>
                         <a:t>@</a:t>
                       </a:r>
-                      <a:endParaRPr lang="en-US" sz="1000" b="0" kern="1200" dirty="0">
+                      <a:endParaRPr lang="en-US" sz="1100" b="0" kern="1200" dirty="0">
                         <a:solidFill>
                           <a:schemeClr val="dk1"/>
                         </a:solidFill>
@@ -7501,7 +7501,7 @@
                         <a:defRPr/>
                       </a:pPr>
                       <a:r>
-                        <a:rPr lang="en-US" sz="1000" b="1" kern="1200" baseline="0" dirty="0" smtClean="0">
+                        <a:rPr lang="en-US" sz="1100" b="1" kern="1200" baseline="0" dirty="0" smtClean="0">
                           <a:solidFill>
                             <a:schemeClr val="dk1"/>
                           </a:solidFill>
@@ -7511,7 +7511,7 @@
                         </a:rPr>
                         <a:t>Current Holdings:</a:t>
                       </a:r>
-                      <a:endParaRPr lang="en-US" sz="1000" b="1" kern="1200" baseline="0" dirty="0">
+                      <a:endParaRPr lang="en-US" sz="1100" b="1" kern="1200" baseline="0" dirty="0">
                         <a:solidFill>
                           <a:schemeClr val="dk1"/>
                         </a:solidFill>
@@ -7578,7 +7578,7 @@
                         <a:defRPr/>
                       </a:pPr>
                       <a:r>
-                        <a:rPr lang="en-US" sz="1000" b="0" kern="1200" baseline="0" smtClean="0">
+                        <a:rPr lang="en-US" sz="1100" b="0" kern="1200" baseline="0" smtClean="0">
                           <a:solidFill>
                             <a:schemeClr val="dk1"/>
                           </a:solidFill>
@@ -7588,7 +7588,7 @@
                         </a:rPr>
                         <a:t>@</a:t>
                       </a:r>
-                      <a:endParaRPr lang="en-US" sz="1000" b="0" kern="1200" baseline="0" dirty="0">
+                      <a:endParaRPr lang="en-US" sz="1100" b="0" kern="1200" baseline="0" dirty="0">
                         <a:solidFill>
                           <a:schemeClr val="dk1"/>
                         </a:solidFill>
@@ -7659,7 +7659,7 @@
                         <a:defRPr/>
                       </a:pPr>
                       <a:r>
-                        <a:rPr lang="en-US" sz="1000" b="1" kern="1200" dirty="0" smtClean="0">
+                        <a:rPr lang="en-US" sz="1100" b="1" kern="1200" dirty="0" smtClean="0">
                           <a:solidFill>
                             <a:schemeClr val="dk1"/>
                           </a:solidFill>
@@ -7669,7 +7669,7 @@
                         </a:rPr>
                         <a:t>Country:</a:t>
                       </a:r>
-                      <a:endParaRPr lang="en-US" sz="1000" b="1" kern="1200" dirty="0">
+                      <a:endParaRPr lang="en-US" sz="1100" b="1" kern="1200" dirty="0">
                         <a:solidFill>
                           <a:schemeClr val="dk1"/>
                         </a:solidFill>
@@ -7732,7 +7732,7 @@
                         <a:defRPr/>
                       </a:pPr>
                       <a:r>
-                        <a:rPr lang="en-US" sz="1000" b="0" kern="1200" dirty="0" smtClean="0">
+                        <a:rPr lang="en-US" sz="1100" b="0" kern="1200" dirty="0" smtClean="0">
                           <a:solidFill>
                             <a:schemeClr val="dk1"/>
                           </a:solidFill>
@@ -7742,7 +7742,7 @@
                         </a:rPr>
                         <a:t>@</a:t>
                       </a:r>
-                      <a:endParaRPr lang="en-US" sz="1000" b="0" kern="1200" dirty="0">
+                      <a:endParaRPr lang="en-US" sz="1100" b="0" kern="1200" dirty="0">
                         <a:solidFill>
                           <a:schemeClr val="dk1"/>
                         </a:solidFill>
@@ -7803,7 +7803,7 @@
                         <a:defRPr/>
                       </a:pPr>
                       <a:r>
-                        <a:rPr lang="en-US" sz="1000" b="1" kern="1200" baseline="0" dirty="0" smtClean="0">
+                        <a:rPr lang="en-US" sz="1100" b="1" kern="1200" baseline="0" dirty="0" smtClean="0">
                           <a:solidFill>
                             <a:schemeClr val="dk1"/>
                           </a:solidFill>
@@ -7813,7 +7813,7 @@
                         </a:rPr>
                         <a:t>% of NAV</a:t>
                       </a:r>
-                      <a:endParaRPr lang="en-US" sz="1000" b="1" kern="1200" baseline="0" dirty="0">
+                      <a:endParaRPr lang="en-US" sz="1100" b="1" kern="1200" baseline="0" dirty="0">
                         <a:solidFill>
                           <a:schemeClr val="dk1"/>
                         </a:solidFill>
@@ -7874,7 +7874,7 @@
                         <a:defRPr/>
                       </a:pPr>
                       <a:r>
-                        <a:rPr lang="en-US" sz="1000" b="0" kern="1200" baseline="0" smtClean="0">
+                        <a:rPr lang="en-US" sz="1100" b="0" kern="1200" baseline="0" smtClean="0">
                           <a:solidFill>
                             <a:schemeClr val="dk1"/>
                           </a:solidFill>
@@ -7884,7 +7884,7 @@
                         </a:rPr>
                         <a:t>@</a:t>
                       </a:r>
-                      <a:endParaRPr lang="en-US" sz="1000" b="0" kern="1200" baseline="0" dirty="0">
+                      <a:endParaRPr lang="en-US" sz="1100" b="0" kern="1200" baseline="0" dirty="0">
                         <a:solidFill>
                           <a:schemeClr val="dk1"/>
                         </a:solidFill>
@@ -7932,10 +7932,10 @@
                     <a:lstStyle/>
                     <a:p>
                       <a:r>
-                        <a:rPr lang="en-US" sz="1000" b="1" dirty="0" smtClean="0"/>
+                        <a:rPr lang="en-US" sz="1100" b="1" dirty="0" smtClean="0"/>
                         <a:t>Industry:</a:t>
                       </a:r>
-                      <a:endParaRPr lang="en-US" sz="1000" b="1" dirty="0"/>
+                      <a:endParaRPr lang="en-US" sz="1100" b="1" dirty="0"/>
                     </a:p>
                   </a:txBody>
                   <a:tcPr marL="91458" marR="91458" marT="45741" marB="45741">
@@ -7974,10 +7974,10 @@
                     <a:lstStyle/>
                     <a:p>
                       <a:r>
-                        <a:rPr lang="en-US" sz="1000" dirty="0" smtClean="0"/>
+                        <a:rPr lang="en-US" sz="1100" dirty="0" smtClean="0"/>
                         <a:t>@</a:t>
                       </a:r>
-                      <a:endParaRPr lang="en-US" sz="1000" dirty="0"/>
+                      <a:endParaRPr lang="en-US" sz="1100" dirty="0"/>
                     </a:p>
                   </a:txBody>
                   <a:tcPr marL="91458" marR="91458" marT="45741" marB="45741">
@@ -8014,10 +8014,10 @@
                     <a:lstStyle/>
                     <a:p>
                       <a:r>
-                        <a:rPr lang="en-US" sz="1000" b="1" baseline="0" dirty="0" smtClean="0"/>
+                        <a:rPr lang="en-US" sz="1100" b="1" baseline="0" dirty="0" smtClean="0"/>
                         <a:t>BM Weight:</a:t>
                       </a:r>
-                      <a:endParaRPr lang="en-US" sz="1000" b="1" dirty="0"/>
+                      <a:endParaRPr lang="en-US" sz="1100" b="1" dirty="0"/>
                     </a:p>
                   </a:txBody>
                   <a:tcPr marL="91458" marR="91458" marT="45741" marB="45741">
@@ -8071,10 +8071,10 @@
                         <a:defRPr/>
                       </a:pPr>
                       <a:r>
-                        <a:rPr lang="en-US" sz="1000" baseline="0" dirty="0" smtClean="0"/>
+                        <a:rPr lang="en-US" sz="1100" baseline="0" dirty="0" smtClean="0"/>
                         <a:t>@</a:t>
                       </a:r>
-                      <a:endParaRPr lang="en-US" sz="1000" dirty="0"/>
+                      <a:endParaRPr lang="en-US" sz="1100" dirty="0"/>
                     </a:p>
                   </a:txBody>
                   <a:tcPr marL="91458" marR="91458" marT="45741" marB="45741">
@@ -8132,7 +8132,7 @@
                         <a:defRPr/>
                       </a:pPr>
                       <a:r>
-                        <a:rPr lang="en-US" sz="1000" b="1" kern="1200" dirty="0" err="1" smtClean="0">
+                        <a:rPr lang="en-US" sz="1100" b="1" kern="1200" dirty="0" err="1" smtClean="0">
                           <a:solidFill>
                             <a:schemeClr val="dk1"/>
                           </a:solidFill>
@@ -8143,7 +8143,7 @@
                         <a:t>Mkt</a:t>
                       </a:r>
                       <a:r>
-                        <a:rPr lang="en-US" sz="1000" b="1" kern="1200" dirty="0" smtClean="0">
+                        <a:rPr lang="en-US" sz="1100" b="1" kern="1200" dirty="0" smtClean="0">
                           <a:solidFill>
                             <a:schemeClr val="dk1"/>
                           </a:solidFill>
@@ -8153,7 +8153,7 @@
                         </a:rPr>
                         <a:t> Cap:</a:t>
                       </a:r>
-                      <a:endParaRPr lang="en-US" sz="1000" b="1" kern="1200" dirty="0">
+                      <a:endParaRPr lang="en-US" sz="1100" b="1" kern="1200" dirty="0">
                         <a:solidFill>
                           <a:schemeClr val="dk1"/>
                         </a:solidFill>
@@ -8216,7 +8216,7 @@
                         <a:defRPr/>
                       </a:pPr>
                       <a:r>
-                        <a:rPr lang="en-US" sz="1000" kern="1200" dirty="0" smtClean="0">
+                        <a:rPr lang="en-US" sz="1100" kern="1200" dirty="0" smtClean="0">
                           <a:solidFill>
                             <a:schemeClr val="dk1"/>
                           </a:solidFill>
@@ -8226,7 +8226,7 @@
                         </a:rPr>
                         <a:t>@</a:t>
                       </a:r>
-                      <a:endParaRPr lang="en-US" sz="1000" kern="1200" dirty="0">
+                      <a:endParaRPr lang="en-US" sz="1100" kern="1200" dirty="0">
                         <a:solidFill>
                           <a:schemeClr val="dk1"/>
                         </a:solidFill>
@@ -8287,7 +8287,7 @@
                         <a:defRPr/>
                       </a:pPr>
                       <a:r>
-                        <a:rPr lang="en-US" sz="1000" b="1" kern="1200" baseline="0" dirty="0" smtClean="0">
+                        <a:rPr lang="en-US" sz="1100" b="1" kern="1200" baseline="0" dirty="0" smtClean="0">
                           <a:solidFill>
                             <a:schemeClr val="dk1"/>
                           </a:solidFill>
@@ -8297,7 +8297,7 @@
                         </a:rPr>
                         <a:t>Active Weight: </a:t>
                       </a:r>
-                      <a:endParaRPr lang="en-US" sz="1000" b="1" kern="1200" baseline="0" dirty="0">
+                      <a:endParaRPr lang="en-US" sz="1100" b="1" kern="1200" baseline="0" dirty="0">
                         <a:solidFill>
                           <a:schemeClr val="dk1"/>
                         </a:solidFill>
@@ -8358,7 +8358,7 @@
                         <a:defRPr/>
                       </a:pPr>
                       <a:r>
-                        <a:rPr lang="en-US" sz="1000" kern="1200" baseline="0" dirty="0" smtClean="0">
+                        <a:rPr lang="en-US" sz="1100" kern="1200" baseline="0" dirty="0" smtClean="0">
                           <a:solidFill>
                             <a:schemeClr val="dk1"/>
                           </a:solidFill>
@@ -8368,7 +8368,7 @@
                         </a:rPr>
                         <a:t>@</a:t>
                       </a:r>
-                      <a:endParaRPr lang="en-US" sz="1000" kern="1200" baseline="0" dirty="0">
+                      <a:endParaRPr lang="en-US" sz="1100" kern="1200" baseline="0" dirty="0">
                         <a:solidFill>
                           <a:schemeClr val="dk1"/>
                         </a:solidFill>
@@ -8433,7 +8433,7 @@
                         <a:defRPr/>
                       </a:pPr>
                       <a:r>
-                        <a:rPr lang="en-US" sz="1000" b="1" kern="1200" dirty="0" smtClean="0">
+                        <a:rPr lang="en-US" sz="1100" b="1" kern="1200" dirty="0" smtClean="0">
                           <a:solidFill>
                             <a:schemeClr val="dk1"/>
                           </a:solidFill>
@@ -8443,7 +8443,7 @@
                         </a:rPr>
                         <a:t>Price:</a:t>
                       </a:r>
-                      <a:endParaRPr lang="en-US" sz="1000" b="1" kern="1200" dirty="0">
+                      <a:endParaRPr lang="en-US" sz="1100" b="1" kern="1200" dirty="0">
                         <a:solidFill>
                           <a:schemeClr val="dk1"/>
                         </a:solidFill>
@@ -8506,7 +8506,7 @@
                         <a:defRPr/>
                       </a:pPr>
                       <a:r>
-                        <a:rPr lang="en-US" sz="1000" kern="1200" dirty="0" smtClean="0">
+                        <a:rPr lang="en-US" sz="1100" kern="1200" dirty="0" smtClean="0">
                           <a:solidFill>
                             <a:schemeClr val="dk1"/>
                           </a:solidFill>
@@ -8516,7 +8516,7 @@
                         </a:rPr>
                         <a:t>@</a:t>
                       </a:r>
-                      <a:endParaRPr lang="en-US" sz="1000" kern="1200" dirty="0">
+                      <a:endParaRPr lang="en-US" sz="1100" kern="1200" dirty="0">
                         <a:solidFill>
                           <a:schemeClr val="dk1"/>
                         </a:solidFill>
@@ -8560,22 +8560,22 @@
                     <a:lstStyle/>
                     <a:p>
                       <a:r>
-                        <a:rPr lang="en-US" sz="1000" b="1" dirty="0" smtClean="0"/>
+                        <a:rPr lang="en-US" sz="1100" b="1" dirty="0" smtClean="0"/>
                         <a:t>12m</a:t>
                       </a:r>
                       <a:r>
-                        <a:rPr lang="en-US" sz="1000" b="1" baseline="0" dirty="0" smtClean="0"/>
+                        <a:rPr lang="en-US" sz="1100" b="1" baseline="0" dirty="0" smtClean="0"/>
                         <a:t> Ret - </a:t>
                       </a:r>
                       <a:r>
-                        <a:rPr lang="en-US" sz="1000" b="1" dirty="0" smtClean="0"/>
+                        <a:rPr lang="en-US" sz="1100" b="1" dirty="0" smtClean="0"/>
                         <a:t>Absolute:</a:t>
                       </a:r>
                       <a:r>
-                        <a:rPr lang="en-US" sz="1000" b="1" baseline="0" dirty="0" smtClean="0"/>
+                        <a:rPr lang="en-US" sz="1100" b="1" baseline="0" dirty="0" smtClean="0"/>
                         <a:t> </a:t>
                       </a:r>
-                      <a:endParaRPr lang="en-US" sz="1000" b="1" dirty="0"/>
+                      <a:endParaRPr lang="en-US" sz="1100" b="1" dirty="0"/>
                     </a:p>
                   </a:txBody>
                   <a:tcPr marL="91458" marR="91458" marT="45741" marB="45741">
@@ -8612,10 +8612,10 @@
                     <a:lstStyle/>
                     <a:p>
                       <a:r>
-                        <a:rPr lang="en-US" sz="1000" dirty="0" smtClean="0"/>
+                        <a:rPr lang="en-US" sz="1100" dirty="0" smtClean="0"/>
                         <a:t>@</a:t>
                       </a:r>
-                      <a:endParaRPr lang="en-US" sz="1000" dirty="0"/>
+                      <a:endParaRPr lang="en-US" sz="1100" dirty="0"/>
                     </a:p>
                   </a:txBody>
                   <a:tcPr marL="91458" marR="91458" marT="45741" marB="45741">
@@ -8656,18 +8656,18 @@
                     <a:lstStyle/>
                     <a:p>
                       <a:r>
-                        <a:rPr lang="en-US" sz="1000" b="1" dirty="0" smtClean="0"/>
+                        <a:rPr lang="en-US" sz="1100" b="1" dirty="0" smtClean="0"/>
                         <a:t>FV </a:t>
                       </a:r>
                       <a:r>
-                        <a:rPr lang="en-US" sz="1000" b="1" dirty="0" err="1" smtClean="0"/>
+                        <a:rPr lang="en-US" sz="1100" b="1" dirty="0" err="1" smtClean="0"/>
                         <a:t>Calc</a:t>
                       </a:r>
                       <a:r>
-                        <a:rPr lang="en-US" sz="1000" b="1" dirty="0" smtClean="0"/>
+                        <a:rPr lang="en-US" sz="1100" b="1" dirty="0" smtClean="0"/>
                         <a:t>:</a:t>
                       </a:r>
-                      <a:endParaRPr lang="en-US" sz="1000" b="1" dirty="0"/>
+                      <a:endParaRPr lang="en-US" sz="1100" b="1" dirty="0"/>
                     </a:p>
                   </a:txBody>
                   <a:tcPr marL="91458" marR="91458" marT="45741" marB="45741">
@@ -8727,10 +8727,10 @@
                         <a:defRPr/>
                       </a:pPr>
                       <a:r>
-                        <a:rPr lang="en-US" sz="1000" dirty="0" smtClean="0"/>
+                        <a:rPr lang="en-US" sz="1100" dirty="0" smtClean="0"/>
                         <a:t>@</a:t>
                       </a:r>
-                      <a:endParaRPr lang="en-US" sz="1000" dirty="0"/>
+                      <a:endParaRPr lang="en-US" sz="1100" dirty="0"/>
                     </a:p>
                   </a:txBody>
                   <a:tcPr marL="91458" marR="91458" marT="45741" marB="45741">
@@ -8771,30 +8771,30 @@
                     <a:lstStyle/>
                     <a:p>
                       <a:r>
-                        <a:rPr lang="en-US" sz="1000" b="1" dirty="0" smtClean="0"/>
+                        <a:rPr lang="en-US" sz="1100" b="1" dirty="0" smtClean="0"/>
                         <a:t>12</a:t>
                       </a:r>
                       <a:r>
-                        <a:rPr lang="en-US" sz="1000" b="1" baseline="0" dirty="0" smtClean="0"/>
+                        <a:rPr lang="en-US" sz="1100" b="1" baseline="0" dirty="0" smtClean="0"/>
                         <a:t>m Ret - </a:t>
                       </a:r>
                       <a:r>
-                        <a:rPr lang="en-US" sz="1000" b="1" dirty="0" err="1" smtClean="0"/>
+                        <a:rPr lang="en-US" sz="1100" b="1" dirty="0" err="1" smtClean="0"/>
                         <a:t>Rel</a:t>
                       </a:r>
                       <a:r>
-                        <a:rPr lang="en-US" sz="1000" b="1" baseline="0" dirty="0" smtClean="0"/>
+                        <a:rPr lang="en-US" sz="1100" b="1" baseline="0" dirty="0" smtClean="0"/>
                         <a:t> to </a:t>
                       </a:r>
                       <a:r>
-                        <a:rPr lang="en-US" sz="1000" b="1" baseline="0" dirty="0" err="1" smtClean="0"/>
+                        <a:rPr lang="en-US" sz="1100" b="1" baseline="0" dirty="0" err="1" smtClean="0"/>
                         <a:t>loc</a:t>
                       </a:r>
                       <a:r>
-                        <a:rPr lang="en-US" sz="1000" b="1" baseline="0" dirty="0" smtClean="0"/>
+                        <a:rPr lang="en-US" sz="1100" b="1" baseline="0" dirty="0" smtClean="0"/>
                         <a:t>:</a:t>
                       </a:r>
-                      <a:endParaRPr lang="en-US" sz="1000" b="1" dirty="0"/>
+                      <a:endParaRPr lang="en-US" sz="1100" b="1" dirty="0"/>
                     </a:p>
                   </a:txBody>
                   <a:tcPr marL="91458" marR="91458" marT="45741" marB="45741">
@@ -8835,10 +8835,10 @@
                     <a:lstStyle/>
                     <a:p>
                       <a:r>
-                        <a:rPr lang="en-US" sz="1000" dirty="0" smtClean="0"/>
+                        <a:rPr lang="en-US" sz="1100" dirty="0" smtClean="0"/>
                         <a:t>@</a:t>
                       </a:r>
-                      <a:endParaRPr lang="en-US" sz="1000" dirty="0"/>
+                      <a:endParaRPr lang="en-US" sz="1100" dirty="0"/>
                     </a:p>
                   </a:txBody>
                   <a:tcPr marL="91458" marR="91458" marT="45741" marB="45741">
@@ -8883,30 +8883,14 @@
                     <a:lstStyle/>
                     <a:p>
                       <a:r>
-                        <a:rPr lang="en-US" sz="1000" b="1" dirty="0" smtClean="0"/>
+                        <a:rPr lang="en-US" sz="1100" b="1" smtClean="0"/>
                         <a:t>Buy/</a:t>
                       </a:r>
                       <a:r>
-                        <a:rPr lang="en-US" sz="1000" b="1" baseline="0" dirty="0" smtClean="0"/>
-                        <a:t>Sell </a:t>
+                        <a:rPr lang="en-US" sz="1100" b="1" baseline="0" smtClean="0"/>
+                        <a:t>Sell Range:</a:t>
                       </a:r>
-                      <a:r>
-                        <a:rPr lang="en-US" sz="1000" b="1" baseline="0" dirty="0" err="1" smtClean="0"/>
-                        <a:t>vs</a:t>
-                      </a:r>
-                      <a:r>
-                        <a:rPr lang="en-US" sz="1000" b="1" baseline="0" dirty="0" smtClean="0"/>
-                        <a:t> </a:t>
-                      </a:r>
-                      <a:r>
-                        <a:rPr lang="en-US" sz="1000" b="1" baseline="0" dirty="0" err="1" smtClean="0"/>
-                        <a:t>Crnt</a:t>
-                      </a:r>
-                      <a:r>
-                        <a:rPr lang="en-US" sz="1000" b="1" baseline="0" dirty="0" smtClean="0"/>
-                        <a:t>:</a:t>
-                      </a:r>
-                      <a:endParaRPr lang="en-US" sz="1000" b="1" dirty="0"/>
+                      <a:endParaRPr lang="en-US" sz="1100" b="1" dirty="0"/>
                     </a:p>
                   </a:txBody>
                   <a:tcPr marL="91458" marR="91458" marT="45741" marB="45741">
@@ -8968,10 +8952,10 @@
                         <a:defRPr/>
                       </a:pPr>
                       <a:r>
-                        <a:rPr lang="en-US" sz="1000" dirty="0" smtClean="0"/>
+                        <a:rPr lang="en-US" sz="1100" dirty="0" smtClean="0"/>
                         <a:t>@</a:t>
                       </a:r>
-                      <a:endParaRPr lang="en-US" sz="1000" dirty="0"/>
+                      <a:endParaRPr lang="en-US" sz="1100" dirty="0"/>
                     </a:p>
                   </a:txBody>
                   <a:tcPr marL="91458" marR="91458" marT="45741" marB="45741">
@@ -9014,18 +8998,18 @@
                     <a:lstStyle/>
                     <a:p>
                       <a:r>
-                        <a:rPr lang="en-US" sz="1000" b="1" baseline="0" dirty="0" smtClean="0"/>
+                        <a:rPr lang="en-US" sz="1100" b="1" baseline="0" dirty="0" smtClean="0"/>
                         <a:t>12m Ret - </a:t>
                       </a:r>
                       <a:r>
-                        <a:rPr lang="en-US" sz="1000" b="1" baseline="0" dirty="0" err="1" smtClean="0"/>
+                        <a:rPr lang="en-US" sz="1100" b="1" baseline="0" dirty="0" err="1" smtClean="0"/>
                         <a:t>Rel</a:t>
                       </a:r>
                       <a:r>
-                        <a:rPr lang="en-US" sz="1000" b="1" baseline="0" dirty="0" smtClean="0"/>
+                        <a:rPr lang="en-US" sz="1100" b="1" baseline="0" dirty="0" smtClean="0"/>
                         <a:t> to EM: </a:t>
                       </a:r>
-                      <a:endParaRPr lang="en-US" sz="1000" b="1" dirty="0"/>
+                      <a:endParaRPr lang="en-US" sz="1100" b="1" dirty="0"/>
                     </a:p>
                   </a:txBody>
                   <a:tcPr marL="91458" marR="91458" marT="45741" marB="45741">
@@ -9068,10 +9052,10 @@
                     <a:lstStyle/>
                     <a:p>
                       <a:r>
-                        <a:rPr lang="en-US" sz="1000" dirty="0" smtClean="0"/>
+                        <a:rPr lang="en-US" sz="1100" dirty="0" smtClean="0"/>
                         <a:t>@</a:t>
                       </a:r>
-                      <a:endParaRPr lang="en-US" sz="1000" dirty="0"/>
+                      <a:endParaRPr lang="en-US" sz="1100" dirty="0"/>
                     </a:p>
                   </a:txBody>
                   <a:tcPr marL="91458" marR="91458" marT="45741" marB="45741">
@@ -9361,7 +9345,7 @@
             </a:pPr>
             <a:fld id="{B9F65A27-B0FB-41A7-9B79-039B634A0561}" type="datetime4">
               <a:rPr lang="en-US" smtClean="0"/>
-              <a:t>October 4, 2012</a:t>
+              <a:t>October 9, 2012</a:t>
             </a:fld>
             <a:endParaRPr lang="en-US"/>
           </a:p>
@@ -9447,33 +9431,41 @@
           <a:lstStyle/>
           <a:p>
             <a:r>
-              <a:rPr lang="en-US" smtClean="0"/>
+              <a:rPr lang="en-US" dirty="0" smtClean="0"/>
               <a:t>Highlight  key reasons why we want to own this stock. </a:t>
             </a:r>
             <a:r>
-              <a:rPr lang="en-US" b="1" smtClean="0"/>
+              <a:rPr lang="en-US" b="1" dirty="0" smtClean="0"/>
               <a:t>Readers should be able to come to a conclusion based on this slide alone. </a:t>
             </a:r>
             <a:r>
-              <a:rPr lang="en-US" smtClean="0"/>
+              <a:rPr lang="en-US" dirty="0" smtClean="0"/>
               <a:t>We need to be clear and concise – this is not easily done!</a:t>
             </a:r>
           </a:p>
           <a:p>
             <a:r>
-              <a:rPr lang="en-US" smtClean="0"/>
-              <a:t>Limit this slide to 4 bullet points. </a:t>
-            </a:r>
-          </a:p>
-          <a:p>
-            <a:endParaRPr lang="en-US" smtClean="0"/>
+              <a:rPr lang="en-US" dirty="0" smtClean="0"/>
+              <a:t>Limit this slide </a:t>
+            </a:r>
+            <a:r>
+              <a:rPr lang="en-US" dirty="0" smtClean="0"/>
+              <a:t>to 5 </a:t>
+            </a:r>
+            <a:r>
+              <a:rPr lang="en-US" dirty="0" smtClean="0"/>
+              <a:t>bullet points. </a:t>
+            </a:r>
+          </a:p>
+          <a:p>
+            <a:endParaRPr lang="en-US" dirty="0" smtClean="0"/>
           </a:p>
           <a:p>
             <a:pPr lvl="1"/>
-            <a:endParaRPr lang="en-US" smtClean="0"/>
-          </a:p>
-          <a:p>
-            <a:endParaRPr lang="en-US" smtClean="0"/>
+            <a:endParaRPr lang="en-US" dirty="0" smtClean="0"/>
+          </a:p>
+          <a:p>
+            <a:endParaRPr lang="en-US" dirty="0" smtClean="0"/>
           </a:p>
         </p:txBody>
       </p:sp>
@@ -9622,7 +9614,7 @@
               </a:spcAft>
             </a:pPr>
             <a:r>
-              <a:rPr lang="en-US" sz="1600"/>
+              <a:rPr lang="en-US" sz="1600" dirty="0"/>
               <a:t>Risks to Investment Thesis – What could go wrong?</a:t>
             </a:r>
           </a:p>
@@ -9636,9 +9628,22 @@
               </a:spcAft>
             </a:pPr>
             <a:r>
-              <a:rPr lang="en-US" sz="1400" i="1"/>
-              <a:t>- Highlight the key risk our investment thesis: ie Cost improvements may not materialize</a:t>
-            </a:r>
+              <a:rPr lang="en-US" sz="1400" i="1" dirty="0"/>
+              <a:t>- Highlight the key risk our investment thesis: </a:t>
+            </a:r>
+            <a:r>
+              <a:rPr lang="en-US" sz="1400" i="1" dirty="0" err="1"/>
+              <a:t>ie</a:t>
+            </a:r>
+            <a:r>
+              <a:rPr lang="en-US" sz="1400" i="1" dirty="0"/>
+              <a:t> Cost improvements may not </a:t>
+            </a:r>
+            <a:r>
+              <a:rPr lang="en-US" sz="1400" i="1" dirty="0" smtClean="0"/>
+              <a:t>materialize (Limit to 4 bullet points)</a:t>
+            </a:r>
+            <a:endParaRPr lang="en-US" sz="1400" i="1" dirty="0"/>
           </a:p>
         </p:txBody>
       </p:sp>
@@ -9805,7 +9810,7 @@
             </a:pPr>
             <a:fld id="{AED26F29-33DF-4B6C-899D-2A3C193178A7}" type="datetime4">
               <a:rPr lang="en-US" smtClean="0"/>
-              <a:t>October 4, 2012</a:t>
+              <a:t>October 9, 2012</a:t>
             </a:fld>
             <a:endParaRPr lang="en-US"/>
           </a:p>
@@ -9863,7 +9868,23 @@
             </a:pPr>
             <a:r>
               <a:rPr lang="en-US" dirty="0" smtClean="0"/>
-              <a:t>HIGHTLIGHT KEY ASSUMPTIONS (5-7) BULLET POINTS. CONSIDER….</a:t>
+              <a:t>HIGHTLIGHT KEY ASSUMPTIONS </a:t>
+            </a:r>
+            <a:r>
+              <a:rPr lang="en-US" dirty="0" smtClean="0"/>
+              <a:t>(LIMIT TO 5 </a:t>
+            </a:r>
+            <a:r>
+              <a:rPr lang="en-US" dirty="0" smtClean="0"/>
+              <a:t>BULLET </a:t>
+            </a:r>
+            <a:r>
+              <a:rPr lang="en-US" dirty="0" smtClean="0"/>
+              <a:t>POINTS). </a:t>
+            </a:r>
+            <a:r>
+              <a:rPr lang="en-US" dirty="0" smtClean="0"/>
+              <a:t>CONSIDER….</a:t>
             </a:r>
           </a:p>
           <a:p>
@@ -10181,7 +10202,7 @@
             </a:pPr>
             <a:fld id="{18538A7C-955F-4A58-A6A9-F847CAE036DD}" type="datetime4">
               <a:rPr lang="en-US" smtClean="0"/>
-              <a:t>October 4, 2012</a:t>
+              <a:t>October 9, 2012</a:t>
             </a:fld>
             <a:endParaRPr lang="en-US"/>
           </a:p>
@@ -10404,7 +10425,7 @@
             </a:pPr>
             <a:fld id="{E9546744-ACC5-4F83-BAFA-157B97354CD4}" type="datetime4">
               <a:rPr lang="en-US" smtClean="0"/>
-              <a:t>October 4, 2012</a:t>
+              <a:t>October 9, 2012</a:t>
             </a:fld>
             <a:endParaRPr lang="en-US"/>
           </a:p>
@@ -10444,24 +10465,33 @@
           <a:lstStyle/>
           <a:p>
             <a:r>
-              <a:rPr lang="en-US" smtClean="0"/>
-              <a:t>Comment on comparables</a:t>
-            </a:r>
-          </a:p>
-          <a:p>
-            <a:r>
-              <a:rPr lang="en-US" smtClean="0"/>
+              <a:rPr lang="en-US" dirty="0" smtClean="0"/>
+              <a:t>Comment on </a:t>
+            </a:r>
+            <a:r>
+              <a:rPr lang="en-US" dirty="0" err="1" smtClean="0"/>
+              <a:t>comparables</a:t>
+            </a:r>
+            <a:r>
+              <a:rPr lang="en-US" dirty="0" smtClean="0"/>
+              <a:t> (Limit this section to 3 Bullet points)</a:t>
+            </a:r>
+            <a:endParaRPr lang="en-US" dirty="0" smtClean="0"/>
+          </a:p>
+          <a:p>
+            <a:r>
+              <a:rPr lang="en-US" dirty="0" smtClean="0"/>
               <a:t>Comment on DCF valuation</a:t>
             </a:r>
           </a:p>
           <a:p>
             <a:r>
-              <a:rPr lang="en-US" smtClean="0"/>
+              <a:rPr lang="en-US" dirty="0" smtClean="0"/>
               <a:t>Comment on your fair value </a:t>
             </a:r>
           </a:p>
           <a:p>
-            <a:endParaRPr lang="en-US" smtClean="0"/>
+            <a:endParaRPr lang="en-US" dirty="0" smtClean="0"/>
           </a:p>
         </p:txBody>
       </p:sp>
@@ -10620,9 +10650,18 @@
               <a:buChar char="n"/>
             </a:pPr>
             <a:r>
-              <a:rPr lang="en-US" sz="1600" b="0"/>
-              <a:t>What is the growth outlook for the company. </a:t>
-            </a:r>
+              <a:rPr lang="en-US" sz="1600" b="0" dirty="0"/>
+              <a:t>What is the growth outlook for the company</a:t>
+            </a:r>
+            <a:r>
+              <a:rPr lang="en-US" sz="1600" b="0" dirty="0" smtClean="0"/>
+              <a:t>.</a:t>
+            </a:r>
+            <a:r>
+              <a:rPr lang="en-IN" sz="1600" b="0" dirty="0"/>
+              <a:t> (Limit this section to 3 Bullet points)</a:t>
+            </a:r>
+            <a:endParaRPr lang="en-US" sz="1600" b="0" dirty="0"/>
           </a:p>
           <a:p>
             <a:pPr algn="l">
@@ -10639,7 +10678,7 @@
               <a:buChar char="n"/>
             </a:pPr>
             <a:r>
-              <a:rPr lang="en-US" sz="1600" b="0"/>
+              <a:rPr lang="en-US" sz="1600" b="0" dirty="0"/>
               <a:t>How sustainable / risky are the growth prospects. </a:t>
             </a:r>
           </a:p>
@@ -10658,7 +10697,7 @@
               <a:buChar char="n"/>
             </a:pPr>
             <a:r>
-              <a:rPr lang="en-US" sz="1600" b="0"/>
+              <a:rPr lang="en-US" sz="1600" b="0" dirty="0"/>
               <a:t>Is the growth being mispriced by the market?</a:t>
             </a:r>
           </a:p>
@@ -10676,7 +10715,7 @@
               <a:buFont typeface="Wingdings" pitchFamily="2" charset="2"/>
               <a:buChar char="n"/>
             </a:pPr>
-            <a:endParaRPr lang="en-US" sz="1600" b="0"/>
+            <a:endParaRPr lang="en-US" sz="1600" b="0" dirty="0"/>
           </a:p>
           <a:p>
             <a:pPr algn="l">
@@ -10692,7 +10731,7 @@
               <a:buFont typeface="Wingdings" pitchFamily="2" charset="2"/>
               <a:buChar char="n"/>
             </a:pPr>
-            <a:endParaRPr lang="en-US" sz="1600" b="0"/>
+            <a:endParaRPr lang="en-US" sz="1600" b="0" dirty="0"/>
           </a:p>
         </p:txBody>
       </p:sp>
@@ -10851,19 +10890,28 @@
               <a:buChar char="n"/>
             </a:pPr>
             <a:r>
-              <a:rPr lang="en-US" sz="1600" b="0"/>
+              <a:rPr lang="en-US" sz="1600" b="0" dirty="0"/>
               <a:t>Is this a high quality company? Why?  </a:t>
             </a:r>
             <a:r>
-              <a:rPr lang="en-US" sz="1600" b="0">
+              <a:rPr lang="en-US" sz="1600" b="0" dirty="0">
                 <a:sym typeface="Wingdings" pitchFamily="2" charset="2"/>
               </a:rPr>
               <a:t> </a:t>
             </a:r>
             <a:r>
-              <a:rPr lang="en-US" sz="1600" b="0"/>
-              <a:t>ROE/Leverage/Sustainable competitive advantage/ Other</a:t>
-            </a:r>
+              <a:rPr lang="en-US" sz="1600" b="0" dirty="0"/>
+              <a:t>ROE/Leverage/Sustainable competitive advantage/ </a:t>
+            </a:r>
+            <a:r>
+              <a:rPr lang="en-US" sz="1600" b="0" dirty="0" smtClean="0"/>
+              <a:t>Other. </a:t>
+            </a:r>
+            <a:r>
+              <a:rPr lang="en-IN" sz="1600" b="0" dirty="0"/>
+              <a:t>(Limit this section to 3 Bullet points)</a:t>
+            </a:r>
+            <a:endParaRPr lang="en-US" sz="1600" b="0" dirty="0"/>
           </a:p>
           <a:p>
             <a:pPr algn="l">
@@ -10879,7 +10927,7 @@
               <a:buFont typeface="Wingdings" pitchFamily="2" charset="2"/>
               <a:buChar char="n"/>
             </a:pPr>
-            <a:endParaRPr lang="en-US" sz="1600" b="0"/>
+            <a:endParaRPr lang="en-US" sz="1600" b="0" dirty="0"/>
           </a:p>
         </p:txBody>
       </p:sp>
@@ -11517,8 +11565,40 @@
                 <a:buChar char="n"/>
               </a:pPr>
               <a:r>
-                <a:rPr lang="en-US" sz="1400" b="0"/>
-                <a:t>MARKET / ENVIRONMENTAL ADVANTAGES</a:t>
+                <a:rPr lang="en-US" sz="1400" b="0" dirty="0"/>
+                <a:t>MARKET / ENVIRONMENTAL </a:t>
+              </a:r>
+              <a:r>
+                <a:rPr lang="en-US" sz="1400" b="0" dirty="0" smtClean="0"/>
+                <a:t>ADVANTAGES</a:t>
+              </a:r>
+              <a:r>
+                <a:rPr lang="en-IN" sz="1400" b="0" dirty="0"/>
+                <a:t> (Limit this section to 4 Bullet points)</a:t>
+              </a:r>
+              <a:endParaRPr lang="en-US" sz="1400" b="0" dirty="0"/>
+            </a:p>
+            <a:p>
+              <a:pPr algn="l">
+                <a:spcBef>
+                  <a:spcPct val="50000"/>
+                </a:spcBef>
+                <a:spcAft>
+                  <a:spcPct val="0"/>
+                </a:spcAft>
+                <a:buClr>
+                  <a:srgbClr val="000099"/>
+                </a:buClr>
+                <a:buFont typeface="Wingdings" pitchFamily="2" charset="2"/>
+                <a:buChar char="n"/>
+              </a:pPr>
+              <a:r>
+                <a:rPr lang="en-US" sz="1400" b="0" dirty="0" err="1"/>
+                <a:t>Ie</a:t>
+              </a:r>
+              <a:r>
+                <a:rPr lang="en-US" sz="1400" b="0" dirty="0"/>
+                <a:t> growing industry, favorable government support</a:t>
               </a:r>
             </a:p>
             <a:p>
@@ -11535,26 +11615,7 @@
                 <a:buFont typeface="Wingdings" pitchFamily="2" charset="2"/>
                 <a:buChar char="n"/>
               </a:pPr>
-              <a:r>
-                <a:rPr lang="en-US" sz="1400" b="0"/>
-                <a:t>Ie growing industry, favorable government support</a:t>
-              </a:r>
-            </a:p>
-            <a:p>
-              <a:pPr algn="l">
-                <a:spcBef>
-                  <a:spcPct val="50000"/>
-                </a:spcBef>
-                <a:spcAft>
-                  <a:spcPct val="0"/>
-                </a:spcAft>
-                <a:buClr>
-                  <a:srgbClr val="000099"/>
-                </a:buClr>
-                <a:buFont typeface="Wingdings" pitchFamily="2" charset="2"/>
-                <a:buChar char="n"/>
-              </a:pPr>
-              <a:endParaRPr lang="en-US" sz="1400" b="0"/>
+              <a:endParaRPr lang="en-US" sz="1400" b="0" dirty="0"/>
             </a:p>
           </p:txBody>
         </p:sp>
@@ -11715,8 +11776,25 @@
               </a:pPr>
               <a:r>
                 <a:rPr lang="en-US" sz="1400" b="0" dirty="0" smtClean="0"/>
-                <a:t>COMPANY SPECIFIC ADVANTAGES</a:t>
+                <a:t>COMPANY SPECIFIC </a:t>
               </a:r>
+              <a:r>
+                <a:rPr lang="en-US" sz="1400" b="0" dirty="0" smtClean="0"/>
+                <a:t>ADVANTAGES</a:t>
+              </a:r>
+              <a:r>
+                <a:rPr lang="en-IN" sz="1400" b="0" dirty="0"/>
+                <a:t> (Limit this section to </a:t>
+              </a:r>
+              <a:r>
+                <a:rPr lang="en-IN" sz="1400" b="0" dirty="0" smtClean="0"/>
+                <a:t>4 </a:t>
+              </a:r>
+              <a:r>
+                <a:rPr lang="en-IN" sz="1400" b="0" dirty="0"/>
+                <a:t>Bullet points)</a:t>
+              </a:r>
+              <a:endParaRPr lang="en-US" sz="1400" b="0" dirty="0" smtClean="0"/>
             </a:p>
             <a:p>
               <a:pPr algn="l">
@@ -11914,9 +11992,18 @@
                 <a:buChar char="n"/>
               </a:pPr>
               <a:r>
-                <a:rPr lang="en-US" sz="1400" b="0"/>
-                <a:t>COMPANY SPECIFIC DISADVANTAGES</a:t>
+                <a:rPr lang="en-US" sz="1400" b="0" dirty="0"/>
+                <a:t>COMPANY SPECIFIC </a:t>
               </a:r>
+              <a:r>
+                <a:rPr lang="en-US" sz="1400" b="0" dirty="0" smtClean="0"/>
+                <a:t>DISADVANTAGES</a:t>
+              </a:r>
+              <a:r>
+                <a:rPr lang="en-IN" sz="1400" b="0" dirty="0"/>
+                <a:t> (Limit this section to 4 Bullet points)</a:t>
+              </a:r>
+              <a:endParaRPr lang="en-US" sz="1400" b="0" dirty="0"/>
             </a:p>
             <a:p>
               <a:pPr algn="l">
@@ -11933,8 +12020,12 @@
                 <a:buChar char="n"/>
               </a:pPr>
               <a:r>
-                <a:rPr lang="en-US" sz="1400" b="0"/>
-                <a:t>Ie high leverage, rising input costs</a:t>
+                <a:rPr lang="en-US" sz="1400" b="0" dirty="0" err="1"/>
+                <a:t>Ie</a:t>
+              </a:r>
+              <a:r>
+                <a:rPr lang="en-US" sz="1400" b="0" dirty="0"/>
+                <a:t> high leverage, rising input costs</a:t>
               </a:r>
             </a:p>
           </p:txBody>
@@ -12094,9 +12185,18 @@
                 <a:buChar char="n"/>
               </a:pPr>
               <a:r>
-                <a:rPr lang="en-US" sz="1400" b="0"/>
-                <a:t>MARKET / ENVIRONMENT DISADVANTAGES</a:t>
+                <a:rPr lang="en-US" sz="1400" b="0" dirty="0"/>
+                <a:t>MARKET / ENVIRONMENT </a:t>
               </a:r>
+              <a:r>
+                <a:rPr lang="en-US" sz="1400" b="0" dirty="0" smtClean="0"/>
+                <a:t>DISADVANTAGES</a:t>
+              </a:r>
+              <a:r>
+                <a:rPr lang="en-IN" sz="1400" b="0" dirty="0"/>
+                <a:t> (Limit this section to 4 Bullet points)</a:t>
+              </a:r>
+              <a:endParaRPr lang="en-US" sz="1400" b="0" dirty="0"/>
             </a:p>
             <a:p>
               <a:pPr algn="l">
@@ -12113,7 +12213,7 @@
                 <a:buChar char="n"/>
               </a:pPr>
               <a:r>
-                <a:rPr lang="en-US" sz="1400" b="0"/>
+                <a:rPr lang="en-US" sz="1400" b="0" dirty="0"/>
                 <a:t>Increasing competition, changing regulatory environment</a:t>
               </a:r>
             </a:p>
@@ -12305,7 +12405,7 @@
             </a:pPr>
             <a:fld id="{BB47A19F-401F-4F92-86F0-35076FCF8C9C}" type="datetime4">
               <a:rPr lang="en-US" smtClean="0"/>
-              <a:t>October 4, 2012</a:t>
+              <a:t>October 9, 2012</a:t>
             </a:fld>
             <a:endParaRPr lang="en-US"/>
           </a:p>

</xml_diff>